<commit_message>
smokeview source: output script errors (if any) at end, update script error image
</commit_message>
<xml_diff>
--- a/for_bundle/script_error1.pptx
+++ b/for_bundle/script_error1.pptx
@@ -3332,10 +3332,10 @@
       </p:grpSpPr>
       <p:sp>
         <p:nvSpPr>
-          <p:cNvPr id="2" name="Rectangle: Rounded Corners 1">
-            <a:extLst>
-              <a:ext uri="{FF2B5EF4-FFF2-40B4-BE49-F238E27FC236}">
-                <a16:creationId xmlns:a16="http://schemas.microsoft.com/office/drawing/2014/main" id="{AE91A5FA-0A6E-4D33-ADC5-1426039BA2FD}"/>
+          <p:cNvPr id="2" name="Rectangle 1">
+            <a:extLst>
+              <a:ext uri="{FF2B5EF4-FFF2-40B4-BE49-F238E27FC236}">
+                <a16:creationId xmlns:a16="http://schemas.microsoft.com/office/drawing/2014/main" id="{C593D8AE-41BE-4790-BAE2-2A3A31E54FE0}"/>
               </a:ext>
             </a:extLst>
           </p:cNvPr>
@@ -3344,20 +3344,15 @@
         </p:nvSpPr>
         <p:spPr>
           <a:xfrm>
-            <a:off x="1001486" y="990600"/>
-            <a:ext cx="4648200" cy="1937657"/>
+            <a:off x="751114" y="457199"/>
+            <a:ext cx="4572000" cy="4572000"/>
           </a:xfrm>
-          <a:prstGeom prst="roundRect">
+          <a:prstGeom prst="rect">
             <a:avLst/>
           </a:prstGeom>
           <a:solidFill>
             <a:schemeClr val="bg1"/>
           </a:solidFill>
-          <a:ln w="38100">
-            <a:solidFill>
-              <a:schemeClr val="tx1"/>
-            </a:solidFill>
-          </a:ln>
         </p:spPr>
         <p:style>
           <a:lnRef idx="2">
@@ -3380,7 +3375,11 @@
           <a:lstStyle/>
           <a:p>
             <a:pPr algn="ctr"/>
-            <a:endParaRPr lang="en-US"/>
+            <a:endParaRPr lang="en-US">
+              <a:solidFill>
+                <a:schemeClr val="bg1"/>
+              </a:solidFill>
+            </a:endParaRPr>
           </a:p>
         </p:txBody>
       </p:sp>
@@ -3398,8 +3397,8 @@
         </p:nvSpPr>
         <p:spPr>
           <a:xfrm>
-            <a:off x="1393372" y="1482375"/>
-            <a:ext cx="3864429" cy="954107"/>
+            <a:off x="1149152" y="1589037"/>
+            <a:ext cx="10069286" cy="2308324"/>
           </a:xfrm>
           <a:prstGeom prst="rect">
             <a:avLst/>
@@ -3413,14 +3412,14 @@
           <a:lstStyle/>
           <a:p>
             <a:r>
-              <a:rPr lang="en-US" sz="2800" dirty="0"/>
-              <a:t>Smokeview script error:</a:t>
-            </a:r>
-          </a:p>
-          <a:p>
-            <a:r>
-              <a:rPr lang="en-US" sz="2800" dirty="0"/>
-              <a:t>viewpoint not found</a:t>
+              <a:rPr lang="en-US" sz="7200" dirty="0"/>
+              <a:t>viewpoint</a:t>
+            </a:r>
+          </a:p>
+          <a:p>
+            <a:r>
+              <a:rPr lang="en-US" sz="7200" dirty="0"/>
+              <a:t>not found</a:t>
             </a:r>
           </a:p>
         </p:txBody>

</xml_diff>